<commit_message>
Update Final Presentation AFTER PRESENTATION XD
I added our picture Xp
</commit_message>
<xml_diff>
--- a/Presentation/Final Presentation.pptx
+++ b/Presentation/Final Presentation.pptx
@@ -5262,6 +5262,41 @@
           <a:chExt cx="0" cy="0"/>
         </a:xfrm>
       </p:grpSpPr>
+      <p:pic>
+        <p:nvPicPr>
+          <p:cNvPr id="4" name="그림 3">
+            <a:extLst>
+              <a:ext uri="{FF2B5EF4-FFF2-40B4-BE49-F238E27FC236}">
+                <a16:creationId xmlns:a16="http://schemas.microsoft.com/office/drawing/2014/main" id="{31148422-374C-4C23-A558-2C4FFB77FDFA}"/>
+              </a:ext>
+            </a:extLst>
+          </p:cNvPr>
+          <p:cNvPicPr>
+            <a:picLocks noChangeAspect="1"/>
+          </p:cNvPicPr>
+          <p:nvPr/>
+        </p:nvPicPr>
+        <p:blipFill rotWithShape="1">
+          <a:blip r:embed="rId2">
+            <a:extLst>
+              <a:ext uri="{28A0092B-C50C-407E-A947-70E740481C1C}">
+                <a14:useLocalDpi xmlns:a14="http://schemas.microsoft.com/office/drawing/2010/main" val="0"/>
+              </a:ext>
+            </a:extLst>
+          </a:blip>
+          <a:srcRect l="-1" t="-185" r="104" b="-260"/>
+          <a:stretch/>
+        </p:blipFill>
+        <p:spPr>
+          <a:xfrm>
+            <a:off x="164592" y="1822082"/>
+            <a:ext cx="8814816" cy="4316447"/>
+          </a:xfrm>
+          <a:prstGeom prst="rect">
+            <a:avLst/>
+          </a:prstGeom>
+        </p:spPr>
+      </p:pic>
       <p:sp>
         <p:nvSpPr>
           <p:cNvPr id="3" name="TextShape 1">
@@ -5591,15 +5626,15 @@
           <p:nvPr/>
         </p:nvPicPr>
         <p:blipFill>
-          <a:blip r:embed="rId2" cstate="print"/>
+          <a:blip r:embed="rId3" cstate="print"/>
           <a:stretch>
             <a:fillRect/>
           </a:stretch>
         </p:blipFill>
         <p:spPr>
           <a:xfrm>
-            <a:off x="5525008" y="5121656"/>
-            <a:ext cx="3454400" cy="1270000"/>
+            <a:off x="7452360" y="6155290"/>
+            <a:ext cx="1527048" cy="561415"/>
           </a:xfrm>
           <a:prstGeom prst="rect">
             <a:avLst/>

</xml_diff>